<commit_message>
corrected func name in AStar
</commit_message>
<xml_diff>
--- a/Presentations/AI - Greedy.pptx
+++ b/Presentations/AI - Greedy.pptx
@@ -204,7 +204,7 @@
           <a:p>
             <a:fld id="{FAF957FC-5175-49AC-8D2B-2F056FFFC1DD}" type="datetimeFigureOut">
               <a:rPr lang="en-US" smtClean="0"/>
-              <a:t>7/4/2017</a:t>
+              <a:t>7/12/2017</a:t>
             </a:fld>
             <a:endParaRPr lang="en-US"/>
           </a:p>
@@ -822,7 +822,7 @@
             <a:fld id="{1D8BD707-D9CF-40AE-B4C6-C98DA3205C09}" type="datetimeFigureOut">
               <a:rPr lang="en-US" smtClean="0"/>
               <a:pPr/>
-              <a:t>7/4/2017</a:t>
+              <a:t>7/12/2017</a:t>
             </a:fld>
             <a:endParaRPr lang="en-US"/>
           </a:p>
@@ -989,7 +989,7 @@
             <a:fld id="{1D8BD707-D9CF-40AE-B4C6-C98DA3205C09}" type="datetimeFigureOut">
               <a:rPr lang="en-US" smtClean="0"/>
               <a:pPr/>
-              <a:t>7/4/2017</a:t>
+              <a:t>7/12/2017</a:t>
             </a:fld>
             <a:endParaRPr lang="en-US"/>
           </a:p>
@@ -1166,7 +1166,7 @@
             <a:fld id="{1D8BD707-D9CF-40AE-B4C6-C98DA3205C09}" type="datetimeFigureOut">
               <a:rPr lang="en-US" smtClean="0"/>
               <a:pPr/>
-              <a:t>7/4/2017</a:t>
+              <a:t>7/12/2017</a:t>
             </a:fld>
             <a:endParaRPr lang="en-US"/>
           </a:p>
@@ -1333,7 +1333,7 @@
             <a:fld id="{1D8BD707-D9CF-40AE-B4C6-C98DA3205C09}" type="datetimeFigureOut">
               <a:rPr lang="en-US" smtClean="0"/>
               <a:pPr/>
-              <a:t>7/4/2017</a:t>
+              <a:t>7/12/2017</a:t>
             </a:fld>
             <a:endParaRPr lang="en-US"/>
           </a:p>
@@ -1576,7 +1576,7 @@
             <a:fld id="{1D8BD707-D9CF-40AE-B4C6-C98DA3205C09}" type="datetimeFigureOut">
               <a:rPr lang="en-US" smtClean="0"/>
               <a:pPr/>
-              <a:t>7/4/2017</a:t>
+              <a:t>7/12/2017</a:t>
             </a:fld>
             <a:endParaRPr lang="en-US"/>
           </a:p>
@@ -1861,7 +1861,7 @@
             <a:fld id="{1D8BD707-D9CF-40AE-B4C6-C98DA3205C09}" type="datetimeFigureOut">
               <a:rPr lang="en-US" smtClean="0"/>
               <a:pPr/>
-              <a:t>7/4/2017</a:t>
+              <a:t>7/12/2017</a:t>
             </a:fld>
             <a:endParaRPr lang="en-US"/>
           </a:p>
@@ -2280,7 +2280,7 @@
             <a:fld id="{1D8BD707-D9CF-40AE-B4C6-C98DA3205C09}" type="datetimeFigureOut">
               <a:rPr lang="en-US" smtClean="0"/>
               <a:pPr/>
-              <a:t>7/4/2017</a:t>
+              <a:t>7/12/2017</a:t>
             </a:fld>
             <a:endParaRPr lang="en-US"/>
           </a:p>
@@ -2395,7 +2395,7 @@
             <a:fld id="{1D8BD707-D9CF-40AE-B4C6-C98DA3205C09}" type="datetimeFigureOut">
               <a:rPr lang="en-US" smtClean="0"/>
               <a:pPr/>
-              <a:t>7/4/2017</a:t>
+              <a:t>7/12/2017</a:t>
             </a:fld>
             <a:endParaRPr lang="en-US"/>
           </a:p>
@@ -2487,7 +2487,7 @@
             <a:fld id="{1D8BD707-D9CF-40AE-B4C6-C98DA3205C09}" type="datetimeFigureOut">
               <a:rPr lang="en-US" smtClean="0"/>
               <a:pPr/>
-              <a:t>7/4/2017</a:t>
+              <a:t>7/12/2017</a:t>
             </a:fld>
             <a:endParaRPr lang="en-US"/>
           </a:p>
@@ -2761,7 +2761,7 @@
             <a:fld id="{1D8BD707-D9CF-40AE-B4C6-C98DA3205C09}" type="datetimeFigureOut">
               <a:rPr lang="en-US" smtClean="0"/>
               <a:pPr/>
-              <a:t>7/4/2017</a:t>
+              <a:t>7/12/2017</a:t>
             </a:fld>
             <a:endParaRPr lang="en-US"/>
           </a:p>
@@ -3011,7 +3011,7 @@
             <a:fld id="{1D8BD707-D9CF-40AE-B4C6-C98DA3205C09}" type="datetimeFigureOut">
               <a:rPr lang="en-US" smtClean="0"/>
               <a:pPr/>
-              <a:t>7/4/2017</a:t>
+              <a:t>7/12/2017</a:t>
             </a:fld>
             <a:endParaRPr lang="en-US"/>
           </a:p>
@@ -3221,7 +3221,7 @@
             <a:fld id="{1D8BD707-D9CF-40AE-B4C6-C98DA3205C09}" type="datetimeFigureOut">
               <a:rPr lang="en-US" smtClean="0"/>
               <a:pPr/>
-              <a:t>7/4/2017</a:t>
+              <a:t>7/12/2017</a:t>
             </a:fld>
             <a:endParaRPr lang="en-US"/>
           </a:p>
@@ -6569,12 +6569,16 @@
               <a:t>function </a:t>
             </a:r>
             <a:r>
+              <a:rPr lang="en-US" b="1" smtClean="0"/>
+              <a:t>AStar( </a:t>
+            </a:r>
+            <a:r>
               <a:rPr lang="en-US" b="1" dirty="0" smtClean="0"/>
-              <a:t>Greedy( </a:t>
+              <a:t>root </a:t>
             </a:r>
             <a:r>
               <a:rPr lang="en-US" b="1" dirty="0"/>
-              <a:t>root , goal)</a:t>
+              <a:t>, goal)</a:t>
             </a:r>
             <a:r>
               <a:rPr lang="en-US" dirty="0"/>
@@ -6951,14 +6955,13 @@
               <a:t>frontier </a:t>
             </a:r>
             <a:r>
-              <a:rPr lang="en-US" b="1"/>
+              <a:rPr lang="en-US" b="1" dirty="0"/>
               <a:t>or </a:t>
             </a:r>
             <a:r>
-              <a:rPr lang="en-US" b="1" u="sng" smtClean="0"/>
+              <a:rPr lang="en-US" b="1" u="sng" dirty="0" smtClean="0"/>
               <a:t>visited</a:t>
             </a:r>
-            <a:endParaRPr lang="en-US" b="1" u="sng" dirty="0" smtClean="0"/>
           </a:p>
           <a:p>
             <a:r>

</xml_diff>

<commit_message>
corrections to greedy search
</commit_message>
<xml_diff>
--- a/Presentations/AI - Greedy.pptx
+++ b/Presentations/AI - Greedy.pptx
@@ -204,7 +204,7 @@
           <a:p>
             <a:fld id="{FAF957FC-5175-49AC-8D2B-2F056FFFC1DD}" type="datetimeFigureOut">
               <a:rPr lang="en-US" smtClean="0"/>
-              <a:t>7/12/2017</a:t>
+              <a:t>7/16/2017</a:t>
             </a:fld>
             <a:endParaRPr lang="en-US"/>
           </a:p>
@@ -822,7 +822,7 @@
             <a:fld id="{1D8BD707-D9CF-40AE-B4C6-C98DA3205C09}" type="datetimeFigureOut">
               <a:rPr lang="en-US" smtClean="0"/>
               <a:pPr/>
-              <a:t>7/12/2017</a:t>
+              <a:t>7/16/2017</a:t>
             </a:fld>
             <a:endParaRPr lang="en-US"/>
           </a:p>
@@ -989,7 +989,7 @@
             <a:fld id="{1D8BD707-D9CF-40AE-B4C6-C98DA3205C09}" type="datetimeFigureOut">
               <a:rPr lang="en-US" smtClean="0"/>
               <a:pPr/>
-              <a:t>7/12/2017</a:t>
+              <a:t>7/16/2017</a:t>
             </a:fld>
             <a:endParaRPr lang="en-US"/>
           </a:p>
@@ -1166,7 +1166,7 @@
             <a:fld id="{1D8BD707-D9CF-40AE-B4C6-C98DA3205C09}" type="datetimeFigureOut">
               <a:rPr lang="en-US" smtClean="0"/>
               <a:pPr/>
-              <a:t>7/12/2017</a:t>
+              <a:t>7/16/2017</a:t>
             </a:fld>
             <a:endParaRPr lang="en-US"/>
           </a:p>
@@ -1333,7 +1333,7 @@
             <a:fld id="{1D8BD707-D9CF-40AE-B4C6-C98DA3205C09}" type="datetimeFigureOut">
               <a:rPr lang="en-US" smtClean="0"/>
               <a:pPr/>
-              <a:t>7/12/2017</a:t>
+              <a:t>7/16/2017</a:t>
             </a:fld>
             <a:endParaRPr lang="en-US"/>
           </a:p>
@@ -1576,7 +1576,7 @@
             <a:fld id="{1D8BD707-D9CF-40AE-B4C6-C98DA3205C09}" type="datetimeFigureOut">
               <a:rPr lang="en-US" smtClean="0"/>
               <a:pPr/>
-              <a:t>7/12/2017</a:t>
+              <a:t>7/16/2017</a:t>
             </a:fld>
             <a:endParaRPr lang="en-US"/>
           </a:p>
@@ -1861,7 +1861,7 @@
             <a:fld id="{1D8BD707-D9CF-40AE-B4C6-C98DA3205C09}" type="datetimeFigureOut">
               <a:rPr lang="en-US" smtClean="0"/>
               <a:pPr/>
-              <a:t>7/12/2017</a:t>
+              <a:t>7/16/2017</a:t>
             </a:fld>
             <a:endParaRPr lang="en-US"/>
           </a:p>
@@ -2280,7 +2280,7 @@
             <a:fld id="{1D8BD707-D9CF-40AE-B4C6-C98DA3205C09}" type="datetimeFigureOut">
               <a:rPr lang="en-US" smtClean="0"/>
               <a:pPr/>
-              <a:t>7/12/2017</a:t>
+              <a:t>7/16/2017</a:t>
             </a:fld>
             <a:endParaRPr lang="en-US"/>
           </a:p>
@@ -2395,7 +2395,7 @@
             <a:fld id="{1D8BD707-D9CF-40AE-B4C6-C98DA3205C09}" type="datetimeFigureOut">
               <a:rPr lang="en-US" smtClean="0"/>
               <a:pPr/>
-              <a:t>7/12/2017</a:t>
+              <a:t>7/16/2017</a:t>
             </a:fld>
             <a:endParaRPr lang="en-US"/>
           </a:p>
@@ -2487,7 +2487,7 @@
             <a:fld id="{1D8BD707-D9CF-40AE-B4C6-C98DA3205C09}" type="datetimeFigureOut">
               <a:rPr lang="en-US" smtClean="0"/>
               <a:pPr/>
-              <a:t>7/12/2017</a:t>
+              <a:t>7/16/2017</a:t>
             </a:fld>
             <a:endParaRPr lang="en-US"/>
           </a:p>
@@ -2761,7 +2761,7 @@
             <a:fld id="{1D8BD707-D9CF-40AE-B4C6-C98DA3205C09}" type="datetimeFigureOut">
               <a:rPr lang="en-US" smtClean="0"/>
               <a:pPr/>
-              <a:t>7/12/2017</a:t>
+              <a:t>7/16/2017</a:t>
             </a:fld>
             <a:endParaRPr lang="en-US"/>
           </a:p>
@@ -3011,7 +3011,7 @@
             <a:fld id="{1D8BD707-D9CF-40AE-B4C6-C98DA3205C09}" type="datetimeFigureOut">
               <a:rPr lang="en-US" smtClean="0"/>
               <a:pPr/>
-              <a:t>7/12/2017</a:t>
+              <a:t>7/16/2017</a:t>
             </a:fld>
             <a:endParaRPr lang="en-US"/>
           </a:p>
@@ -3221,7 +3221,7 @@
             <a:fld id="{1D8BD707-D9CF-40AE-B4C6-C98DA3205C09}" type="datetimeFigureOut">
               <a:rPr lang="en-US" smtClean="0"/>
               <a:pPr/>
-              <a:t>7/12/2017</a:t>
+              <a:t>7/16/2017</a:t>
             </a:fld>
             <a:endParaRPr lang="en-US"/>
           </a:p>
@@ -13112,7 +13112,7 @@
         </p:nvSpPr>
         <p:spPr>
           <a:xfrm>
-            <a:off x="1216273" y="3290041"/>
+            <a:off x="378073" y="3336607"/>
             <a:ext cx="838200" cy="762000"/>
           </a:xfrm>
           <a:prstGeom prst="dodecagon">
@@ -13287,8 +13287,8 @@
         </p:nvCxnSpPr>
         <p:spPr>
           <a:xfrm flipH="1">
-            <a:off x="1942170" y="2553441"/>
-            <a:ext cx="2298700" cy="838694"/>
+            <a:off x="1103970" y="2553441"/>
+            <a:ext cx="3136900" cy="885260"/>
           </a:xfrm>
           <a:prstGeom prst="straightConnector1">
             <a:avLst/>
@@ -13397,7 +13397,7 @@
         </p:nvSpPr>
         <p:spPr>
           <a:xfrm>
-            <a:off x="2128839" y="3486375"/>
+            <a:off x="1216273" y="3540207"/>
             <a:ext cx="902811" cy="369332"/>
           </a:xfrm>
           <a:prstGeom prst="rect">
@@ -13427,7 +13427,7 @@
         </p:nvSpPr>
         <p:spPr>
           <a:xfrm>
-            <a:off x="4919791" y="3486375"/>
+            <a:off x="4814186" y="3518866"/>
             <a:ext cx="902811" cy="369332"/>
           </a:xfrm>
           <a:prstGeom prst="rect">
@@ -13746,7 +13746,7 @@
         </p:nvSpPr>
         <p:spPr>
           <a:xfrm>
-            <a:off x="4744827" y="4222531"/>
+            <a:off x="4206057" y="4898211"/>
             <a:ext cx="1077539" cy="369332"/>
           </a:xfrm>
           <a:prstGeom prst="rect">
@@ -14264,6 +14264,118 @@
                 </a:solidFill>
               </a:rPr>
               <a:t>Optimal is 4,4</a:t>
+            </a:r>
+            <a:endParaRPr lang="en-US" dirty="0"/>
+          </a:p>
+        </p:txBody>
+      </p:sp>
+      <p:sp>
+        <p:nvSpPr>
+          <p:cNvPr id="36" name="Dodecagon 35"/>
+          <p:cNvSpPr/>
+          <p:nvPr/>
+        </p:nvSpPr>
+        <p:spPr>
+          <a:xfrm>
+            <a:off x="2119084" y="3343873"/>
+            <a:ext cx="838200" cy="762000"/>
+          </a:xfrm>
+          <a:prstGeom prst="dodecagon">
+            <a:avLst/>
+          </a:prstGeom>
+        </p:spPr>
+        <p:style>
+          <a:lnRef idx="2">
+            <a:schemeClr val="accent1">
+              <a:shade val="50000"/>
+            </a:schemeClr>
+          </a:lnRef>
+          <a:fillRef idx="1">
+            <a:schemeClr val="accent1"/>
+          </a:fillRef>
+          <a:effectRef idx="0">
+            <a:schemeClr val="accent1"/>
+          </a:effectRef>
+          <a:fontRef idx="minor">
+            <a:schemeClr val="lt1"/>
+          </a:fontRef>
+        </p:style>
+        <p:txBody>
+          <a:bodyPr rtlCol="0" anchor="ctr"/>
+          <a:lstStyle/>
+          <a:p>
+            <a:pPr algn="ctr"/>
+            <a:r>
+              <a:rPr lang="en-US" dirty="0" smtClean="0"/>
+              <a:t>2</a:t>
+            </a:r>
+            <a:endParaRPr lang="en-US" dirty="0"/>
+          </a:p>
+        </p:txBody>
+      </p:sp>
+      <p:cxnSp>
+        <p:nvCxnSpPr>
+          <p:cNvPr id="46" name="Straight Arrow Connector 45"/>
+          <p:cNvCxnSpPr>
+            <a:endCxn id="36" idx="0"/>
+          </p:cNvCxnSpPr>
+          <p:nvPr/>
+        </p:nvCxnSpPr>
+        <p:spPr>
+          <a:xfrm flipH="1">
+            <a:off x="2844981" y="2591173"/>
+            <a:ext cx="1214098" cy="854794"/>
+          </a:xfrm>
+          <a:prstGeom prst="straightConnector1">
+            <a:avLst/>
+          </a:prstGeom>
+          <a:ln w="25400">
+            <a:solidFill>
+              <a:schemeClr val="tx1"/>
+            </a:solidFill>
+            <a:tailEnd type="arrow"/>
+          </a:ln>
+        </p:spPr>
+        <p:style>
+          <a:lnRef idx="1">
+            <a:schemeClr val="accent1"/>
+          </a:lnRef>
+          <a:fillRef idx="0">
+            <a:schemeClr val="accent1"/>
+          </a:fillRef>
+          <a:effectRef idx="0">
+            <a:schemeClr val="accent1"/>
+          </a:effectRef>
+          <a:fontRef idx="minor">
+            <a:schemeClr val="tx1"/>
+          </a:fontRef>
+        </p:style>
+      </p:cxnSp>
+      <p:sp>
+        <p:nvSpPr>
+          <p:cNvPr id="47" name="TextBox 46"/>
+          <p:cNvSpPr txBox="1"/>
+          <p:nvPr/>
+        </p:nvSpPr>
+        <p:spPr>
+          <a:xfrm>
+            <a:off x="2957284" y="3540207"/>
+            <a:ext cx="955711" cy="369332"/>
+          </a:xfrm>
+          <a:prstGeom prst="rect">
+            <a:avLst/>
+          </a:prstGeom>
+          <a:noFill/>
+        </p:spPr>
+        <p:txBody>
+          <a:bodyPr wrap="none" rtlCol="0">
+            <a:spAutoFit/>
+          </a:bodyPr>
+          <a:lstStyle/>
+          <a:p>
+            <a:r>
+              <a:rPr lang="en-US" dirty="0" smtClean="0"/>
+              <a:t>h(2)  = 6</a:t>
             </a:r>
             <a:endParaRPr lang="en-US" dirty="0"/>
           </a:p>

</xml_diff>